<commit_message>
hinweise vor dem start
</commit_message>
<xml_diff>
--- a/2023-04-18/ppts/06_EspHome.pptx
+++ b/2023-04-18/ppts/06_EspHome.pptx
@@ -5,10 +5,10 @@
     <p:sldMasterId id="2147483686" r:id="rId1"/>
   </p:sldMasterIdLst>
   <p:notesMasterIdLst>
-    <p:notesMasterId r:id="rId72"/>
+    <p:notesMasterId r:id="rId73"/>
   </p:notesMasterIdLst>
   <p:handoutMasterIdLst>
-    <p:handoutMasterId r:id="rId73"/>
+    <p:handoutMasterId r:id="rId74"/>
   </p:handoutMasterIdLst>
   <p:sldIdLst>
     <p:sldId id="1373" r:id="rId2"/>
@@ -80,7 +80,8 @@
     <p:sldId id="1420" r:id="rId68"/>
     <p:sldId id="1423" r:id="rId69"/>
     <p:sldId id="1424" r:id="rId70"/>
-    <p:sldId id="1422" r:id="rId71"/>
+    <p:sldId id="1453" r:id="rId71"/>
+    <p:sldId id="1422" r:id="rId72"/>
   </p:sldIdLst>
   <p:sldSz cx="9144000" cy="6858000" type="screen4x3"/>
   <p:notesSz cx="6797675" cy="9926638"/>
@@ -349,7 +350,7 @@
               <a:pPr>
                 <a:defRPr/>
               </a:pPr>
-              <a:t>14.04.2023</a:t>
+              <a:t>18.01.2025</a:t>
             </a:fld>
             <a:endParaRPr lang="de-AT"/>
           </a:p>
@@ -564,7 +565,7 @@
               <a:pPr>
                 <a:defRPr/>
               </a:pPr>
-              <a:t>14.04.2023</a:t>
+              <a:t>18.01.2025</a:t>
             </a:fld>
             <a:endParaRPr lang="de-AT"/>
           </a:p>
@@ -5776,589 +5777,311 @@
           <a:lstStyle/>
           <a:p>
             <a:r>
-              <a:rPr lang="de-AT" dirty="0"/>
-              <a:t>alias: </a:t>
-            </a:r>
-            <a:r>
-              <a:rPr lang="de-AT" dirty="0" err="1"/>
-              <a:t>SensorBox</a:t>
-            </a:r>
-            <a:r>
-              <a:rPr lang="de-AT" dirty="0"/>
-              <a:t> </a:t>
-            </a:r>
-            <a:r>
-              <a:rPr lang="de-AT" dirty="0" err="1"/>
-              <a:t>NeoPixeldescription</a:t>
-            </a:r>
-            <a:r>
-              <a:rPr lang="de-AT" dirty="0"/>
-              <a:t>: ""</a:t>
-            </a:r>
-            <a:r>
-              <a:rPr lang="de-AT" dirty="0" err="1"/>
-              <a:t>trigger</a:t>
-            </a:r>
-            <a:r>
-              <a:rPr lang="de-AT" dirty="0"/>
-              <a:t>:  - </a:t>
-            </a:r>
-            <a:r>
-              <a:rPr lang="de-AT" dirty="0" err="1"/>
-              <a:t>platform</a:t>
-            </a:r>
-            <a:r>
-              <a:rPr lang="de-AT" dirty="0"/>
-              <a:t>: </a:t>
-            </a:r>
-            <a:r>
-              <a:rPr lang="de-AT" dirty="0" err="1"/>
-              <a:t>state</a:t>
-            </a:r>
-            <a:r>
-              <a:rPr lang="de-AT" dirty="0"/>
-              <a:t>    </a:t>
-            </a:r>
-            <a:r>
-              <a:rPr lang="de-AT" dirty="0" err="1"/>
-              <a:t>entity_id</a:t>
-            </a:r>
-            <a:r>
-              <a:rPr lang="de-AT" dirty="0"/>
-              <a:t>:      - sensor.kerui_co2condition: []</a:t>
-            </a:r>
-            <a:r>
-              <a:rPr lang="de-AT" dirty="0" err="1"/>
-              <a:t>action</a:t>
-            </a:r>
-            <a:r>
-              <a:rPr lang="de-AT" dirty="0"/>
-              <a:t>:  - </a:t>
-            </a:r>
-            <a:r>
-              <a:rPr lang="de-AT" dirty="0" err="1"/>
-              <a:t>choose</a:t>
-            </a:r>
-            <a:r>
-              <a:rPr lang="de-AT" dirty="0"/>
-              <a:t>:      - </a:t>
-            </a:r>
-            <a:r>
-              <a:rPr lang="de-AT" dirty="0" err="1"/>
-              <a:t>conditions</a:t>
-            </a:r>
-            <a:r>
-              <a:rPr lang="de-AT" dirty="0"/>
-              <a:t>:          - </a:t>
-            </a:r>
-            <a:r>
-              <a:rPr lang="de-AT" dirty="0" err="1"/>
-              <a:t>condition</a:t>
-            </a:r>
-            <a:r>
-              <a:rPr lang="de-AT" dirty="0"/>
-              <a:t>: </a:t>
-            </a:r>
-            <a:r>
-              <a:rPr lang="de-AT" dirty="0" err="1"/>
-              <a:t>numeric_state</a:t>
-            </a:r>
-            <a:r>
-              <a:rPr lang="de-AT" dirty="0"/>
-              <a:t>            </a:t>
-            </a:r>
-            <a:r>
-              <a:rPr lang="de-AT" dirty="0" err="1"/>
-              <a:t>entity_id</a:t>
-            </a:r>
-            <a:r>
-              <a:rPr lang="de-AT" dirty="0"/>
-              <a:t>: sensor.kerui_co2            </a:t>
-            </a:r>
-            <a:r>
-              <a:rPr lang="de-AT" dirty="0" err="1"/>
-              <a:t>above</a:t>
-            </a:r>
-            <a:r>
-              <a:rPr lang="de-AT" dirty="0"/>
-              <a:t>: 800        </a:t>
-            </a:r>
-            <a:r>
-              <a:rPr lang="de-AT" dirty="0" err="1"/>
-              <a:t>sequence</a:t>
-            </a:r>
-            <a:r>
-              <a:rPr lang="de-AT" dirty="0"/>
-              <a:t>:          - </a:t>
-            </a:r>
-            <a:r>
-              <a:rPr lang="de-AT" dirty="0" err="1"/>
-              <a:t>service</a:t>
-            </a:r>
-            <a:r>
-              <a:rPr lang="de-AT" dirty="0"/>
-              <a:t>: </a:t>
-            </a:r>
-            <a:r>
-              <a:rPr lang="de-AT" dirty="0" err="1"/>
-              <a:t>mqtt.publish</a:t>
-            </a:r>
-            <a:r>
-              <a:rPr lang="de-AT" dirty="0"/>
-              <a:t>            </a:t>
-            </a:r>
-            <a:r>
-              <a:rPr lang="de-AT" dirty="0" err="1"/>
-              <a:t>data</a:t>
-            </a:r>
-            <a:r>
-              <a:rPr lang="de-AT" dirty="0"/>
-              <a:t>:              </a:t>
-            </a:r>
-            <a:r>
-              <a:rPr lang="de-AT" dirty="0" err="1"/>
-              <a:t>qos</a:t>
-            </a:r>
-            <a:r>
-              <a:rPr lang="de-AT" dirty="0"/>
-              <a:t>: "2"              </a:t>
-            </a:r>
-            <a:r>
-              <a:rPr lang="de-AT" dirty="0" err="1"/>
-              <a:t>topic</a:t>
-            </a:r>
-            <a:r>
-              <a:rPr lang="de-AT" dirty="0"/>
-              <a:t>: </a:t>
-            </a:r>
-            <a:r>
-              <a:rPr lang="de-AT" dirty="0" err="1"/>
-              <a:t>kerui</a:t>
-            </a:r>
-            <a:r>
-              <a:rPr lang="de-AT" dirty="0"/>
-              <a:t>/light/</a:t>
-            </a:r>
-            <a:r>
-              <a:rPr lang="de-AT" dirty="0" err="1"/>
-              <a:t>kerui_neopixel_light</a:t>
-            </a:r>
-            <a:r>
-              <a:rPr lang="de-AT" dirty="0"/>
-              <a:t>/</a:t>
-            </a:r>
-            <a:r>
-              <a:rPr lang="de-AT" dirty="0" err="1"/>
-              <a:t>command</a:t>
-            </a:r>
-            <a:r>
-              <a:rPr lang="de-AT" dirty="0"/>
-              <a:t>              </a:t>
-            </a:r>
-            <a:r>
-              <a:rPr lang="de-AT" dirty="0" err="1"/>
-              <a:t>retain</a:t>
-            </a:r>
-            <a:r>
-              <a:rPr lang="de-AT" dirty="0"/>
-              <a:t>: </a:t>
-            </a:r>
-            <a:r>
-              <a:rPr lang="de-AT" dirty="0" err="1"/>
-              <a:t>false</a:t>
-            </a:r>
-            <a:r>
-              <a:rPr lang="de-AT" dirty="0"/>
-              <a:t>              </a:t>
-            </a:r>
-            <a:r>
-              <a:rPr lang="de-AT" dirty="0" err="1"/>
-              <a:t>payload</a:t>
-            </a:r>
-            <a:r>
-              <a:rPr lang="de-AT" dirty="0"/>
-              <a:t>: &gt;-                {   "</a:t>
-            </a:r>
-            <a:r>
-              <a:rPr lang="de-AT" dirty="0" err="1"/>
-              <a:t>color_mode</a:t>
-            </a:r>
-            <a:r>
-              <a:rPr lang="de-AT" dirty="0"/>
-              <a:t>": "</a:t>
-            </a:r>
-            <a:r>
-              <a:rPr lang="de-AT" dirty="0" err="1"/>
-              <a:t>rgb</a:t>
-            </a:r>
-            <a:r>
-              <a:rPr lang="de-AT" dirty="0"/>
-              <a:t>",   "</a:t>
-            </a:r>
-            <a:r>
-              <a:rPr lang="de-AT" dirty="0" err="1"/>
-              <a:t>state</a:t>
-            </a:r>
-            <a:r>
-              <a:rPr lang="de-AT" dirty="0"/>
-              <a:t>": "ON",   "</a:t>
-            </a:r>
-            <a:r>
-              <a:rPr lang="de-AT" dirty="0" err="1"/>
-              <a:t>brightness</a:t>
-            </a:r>
-            <a:r>
-              <a:rPr lang="de-AT" dirty="0"/>
-              <a:t>": 180,                  "</a:t>
-            </a:r>
-            <a:r>
-              <a:rPr lang="de-AT" dirty="0" err="1"/>
-              <a:t>color</a:t>
-            </a:r>
-            <a:r>
-              <a:rPr lang="de-AT" dirty="0"/>
-              <a:t>": {     "r": 255,     "g": 0,     "b": 0   } }      - </a:t>
-            </a:r>
-            <a:r>
-              <a:rPr lang="de-AT" dirty="0" err="1"/>
-              <a:t>conditions</a:t>
-            </a:r>
-            <a:r>
-              <a:rPr lang="de-AT" dirty="0"/>
-              <a:t>:          - </a:t>
-            </a:r>
-            <a:r>
-              <a:rPr lang="de-AT" dirty="0" err="1"/>
-              <a:t>condition</a:t>
-            </a:r>
-            <a:r>
-              <a:rPr lang="de-AT" dirty="0"/>
-              <a:t>: </a:t>
-            </a:r>
-            <a:r>
-              <a:rPr lang="de-AT" dirty="0" err="1"/>
-              <a:t>numeric_state</a:t>
-            </a:r>
-            <a:r>
-              <a:rPr lang="de-AT" dirty="0"/>
-              <a:t>            </a:t>
-            </a:r>
-            <a:r>
-              <a:rPr lang="de-AT" dirty="0" err="1"/>
-              <a:t>entity_id</a:t>
-            </a:r>
-            <a:r>
-              <a:rPr lang="de-AT" dirty="0"/>
-              <a:t>: sensor.kerui_co2            </a:t>
-            </a:r>
-            <a:r>
-              <a:rPr lang="de-AT" dirty="0" err="1"/>
-              <a:t>above</a:t>
-            </a:r>
-            <a:r>
-              <a:rPr lang="de-AT" dirty="0"/>
-              <a:t>: 500            </a:t>
-            </a:r>
-            <a:r>
-              <a:rPr lang="de-AT" dirty="0" err="1"/>
-              <a:t>below</a:t>
-            </a:r>
-            <a:r>
-              <a:rPr lang="de-AT" dirty="0"/>
-              <a:t>: 800        </a:t>
-            </a:r>
-            <a:r>
-              <a:rPr lang="de-AT" dirty="0" err="1"/>
-              <a:t>sequence</a:t>
-            </a:r>
-            <a:r>
-              <a:rPr lang="de-AT" dirty="0"/>
-              <a:t>:          - </a:t>
-            </a:r>
-            <a:r>
-              <a:rPr lang="de-AT" dirty="0" err="1"/>
-              <a:t>service</a:t>
-            </a:r>
-            <a:r>
-              <a:rPr lang="de-AT" dirty="0"/>
-              <a:t>: </a:t>
-            </a:r>
-            <a:r>
-              <a:rPr lang="de-AT" dirty="0" err="1"/>
-              <a:t>mqtt.publish</a:t>
-            </a:r>
-            <a:r>
-              <a:rPr lang="de-AT" dirty="0"/>
-              <a:t>            </a:t>
-            </a:r>
-            <a:r>
-              <a:rPr lang="de-AT" dirty="0" err="1"/>
-              <a:t>data</a:t>
-            </a:r>
-            <a:r>
-              <a:rPr lang="de-AT" dirty="0"/>
-              <a:t>:              </a:t>
-            </a:r>
-            <a:r>
-              <a:rPr lang="de-AT" dirty="0" err="1"/>
-              <a:t>topic</a:t>
-            </a:r>
-            <a:r>
-              <a:rPr lang="de-AT" dirty="0"/>
-              <a:t>: </a:t>
-            </a:r>
-            <a:r>
-              <a:rPr lang="de-AT" dirty="0" err="1"/>
-              <a:t>kerui</a:t>
-            </a:r>
-            <a:r>
-              <a:rPr lang="de-AT" dirty="0"/>
-              <a:t>/light/</a:t>
-            </a:r>
-            <a:r>
-              <a:rPr lang="de-AT" dirty="0" err="1"/>
-              <a:t>kerui_neopixel_light</a:t>
-            </a:r>
-            <a:r>
-              <a:rPr lang="de-AT" dirty="0"/>
-              <a:t>/</a:t>
-            </a:r>
-            <a:r>
-              <a:rPr lang="de-AT" dirty="0" err="1"/>
-              <a:t>command</a:t>
-            </a:r>
-            <a:r>
-              <a:rPr lang="de-AT" dirty="0"/>
-              <a:t>              </a:t>
-            </a:r>
-            <a:r>
-              <a:rPr lang="de-AT" dirty="0" err="1"/>
-              <a:t>retain</a:t>
-            </a:r>
-            <a:r>
-              <a:rPr lang="de-AT" dirty="0"/>
-              <a:t>: </a:t>
-            </a:r>
-            <a:r>
-              <a:rPr lang="de-AT" dirty="0" err="1"/>
-              <a:t>false</a:t>
-            </a:r>
-            <a:r>
-              <a:rPr lang="de-AT" dirty="0"/>
-              <a:t>              </a:t>
-            </a:r>
-            <a:r>
-              <a:rPr lang="de-AT" dirty="0" err="1"/>
-              <a:t>payload</a:t>
-            </a:r>
-            <a:r>
-              <a:rPr lang="de-AT" dirty="0"/>
-              <a:t>: &gt;-                {   "</a:t>
-            </a:r>
-            <a:r>
-              <a:rPr lang="de-AT" dirty="0" err="1"/>
-              <a:t>color_mode</a:t>
-            </a:r>
-            <a:r>
-              <a:rPr lang="de-AT" dirty="0"/>
-              <a:t>": "</a:t>
-            </a:r>
-            <a:r>
-              <a:rPr lang="de-AT" dirty="0" err="1"/>
-              <a:t>rgb</a:t>
-            </a:r>
-            <a:r>
-              <a:rPr lang="de-AT" dirty="0"/>
-              <a:t>",   "</a:t>
-            </a:r>
-            <a:r>
-              <a:rPr lang="de-AT" dirty="0" err="1"/>
-              <a:t>state</a:t>
-            </a:r>
-            <a:r>
-              <a:rPr lang="de-AT" dirty="0"/>
-              <a:t>": "ON",   "</a:t>
-            </a:r>
-            <a:r>
-              <a:rPr lang="de-AT" dirty="0" err="1"/>
-              <a:t>brightness</a:t>
-            </a:r>
-            <a:r>
-              <a:rPr lang="de-AT" dirty="0"/>
-              <a:t>": 180,                  "</a:t>
-            </a:r>
-            <a:r>
-              <a:rPr lang="de-AT" dirty="0" err="1"/>
-              <a:t>color</a:t>
-            </a:r>
-            <a:r>
-              <a:rPr lang="de-AT" dirty="0"/>
-              <a:t>": {     "r": 0,     "g": 0,     "b": 255   } }      - </a:t>
-            </a:r>
-            <a:r>
-              <a:rPr lang="de-AT" dirty="0" err="1"/>
-              <a:t>conditions</a:t>
-            </a:r>
-            <a:r>
-              <a:rPr lang="de-AT" dirty="0"/>
-              <a:t>:          - </a:t>
-            </a:r>
-            <a:r>
-              <a:rPr lang="de-AT" dirty="0" err="1"/>
-              <a:t>condition</a:t>
-            </a:r>
-            <a:r>
-              <a:rPr lang="de-AT" dirty="0"/>
-              <a:t>: </a:t>
-            </a:r>
-            <a:r>
-              <a:rPr lang="de-AT" dirty="0" err="1"/>
-              <a:t>numeric_state</a:t>
-            </a:r>
-            <a:r>
-              <a:rPr lang="de-AT" dirty="0"/>
-              <a:t>            </a:t>
-            </a:r>
-            <a:r>
-              <a:rPr lang="de-AT" dirty="0" err="1"/>
-              <a:t>entity_id</a:t>
-            </a:r>
-            <a:r>
-              <a:rPr lang="de-AT" dirty="0"/>
-              <a:t>: sensor.kerui_co2            </a:t>
-            </a:r>
-            <a:r>
-              <a:rPr lang="de-AT" dirty="0" err="1"/>
-              <a:t>below</a:t>
-            </a:r>
-            <a:r>
-              <a:rPr lang="de-AT" dirty="0"/>
-              <a:t>: 500        </a:t>
-            </a:r>
-            <a:r>
-              <a:rPr lang="de-AT" dirty="0" err="1"/>
-              <a:t>sequence</a:t>
-            </a:r>
-            <a:r>
-              <a:rPr lang="de-AT" dirty="0"/>
-              <a:t>:          - </a:t>
-            </a:r>
-            <a:r>
-              <a:rPr lang="de-AT" dirty="0" err="1"/>
-              <a:t>service</a:t>
-            </a:r>
-            <a:r>
-              <a:rPr lang="de-AT" dirty="0"/>
-              <a:t>: </a:t>
-            </a:r>
-            <a:r>
-              <a:rPr lang="de-AT" dirty="0" err="1"/>
-              <a:t>mqtt.publish</a:t>
-            </a:r>
-            <a:r>
-              <a:rPr lang="de-AT" dirty="0"/>
-              <a:t>            </a:t>
-            </a:r>
-            <a:r>
-              <a:rPr lang="de-AT" dirty="0" err="1"/>
-              <a:t>data</a:t>
-            </a:r>
-            <a:r>
-              <a:rPr lang="de-AT" dirty="0"/>
-              <a:t>:              </a:t>
-            </a:r>
-            <a:r>
-              <a:rPr lang="de-AT" dirty="0" err="1"/>
-              <a:t>qos</a:t>
-            </a:r>
-            <a:r>
-              <a:rPr lang="de-AT" dirty="0"/>
-              <a:t>: "2"              </a:t>
-            </a:r>
-            <a:r>
-              <a:rPr lang="de-AT" dirty="0" err="1"/>
-              <a:t>payload</a:t>
-            </a:r>
-            <a:r>
-              <a:rPr lang="de-AT" dirty="0"/>
-              <a:t>: &gt;-                {   "</a:t>
-            </a:r>
-            <a:r>
-              <a:rPr lang="de-AT" dirty="0" err="1"/>
-              <a:t>color_mode</a:t>
-            </a:r>
-            <a:r>
-              <a:rPr lang="de-AT" dirty="0"/>
-              <a:t>": "</a:t>
-            </a:r>
-            <a:r>
-              <a:rPr lang="de-AT" dirty="0" err="1"/>
-              <a:t>rgb</a:t>
-            </a:r>
-            <a:r>
-              <a:rPr lang="de-AT" dirty="0"/>
-              <a:t>",   "</a:t>
-            </a:r>
-            <a:r>
-              <a:rPr lang="de-AT" dirty="0" err="1"/>
-              <a:t>state</a:t>
-            </a:r>
-            <a:r>
-              <a:rPr lang="de-AT" dirty="0"/>
-              <a:t>": "ON",   "</a:t>
-            </a:r>
-            <a:r>
-              <a:rPr lang="de-AT" dirty="0" err="1"/>
-              <a:t>brightness</a:t>
-            </a:r>
-            <a:r>
-              <a:rPr lang="de-AT" dirty="0"/>
-              <a:t>": 180,                  "</a:t>
-            </a:r>
-            <a:r>
-              <a:rPr lang="de-AT" dirty="0" err="1"/>
-              <a:t>color</a:t>
-            </a:r>
-            <a:r>
-              <a:rPr lang="de-AT" dirty="0"/>
-              <a:t>": {     "r": 0,     "g": 255,     "b": 0   } }              </a:t>
-            </a:r>
-            <a:r>
-              <a:rPr lang="de-AT" dirty="0" err="1"/>
-              <a:t>topic</a:t>
-            </a:r>
-            <a:r>
-              <a:rPr lang="de-AT" dirty="0"/>
-              <a:t>: </a:t>
-            </a:r>
-            <a:r>
-              <a:rPr lang="de-AT" dirty="0" err="1"/>
-              <a:t>kerui</a:t>
-            </a:r>
-            <a:r>
-              <a:rPr lang="de-AT" dirty="0"/>
-              <a:t>/light/</a:t>
-            </a:r>
-            <a:r>
-              <a:rPr lang="de-AT" dirty="0" err="1"/>
-              <a:t>kerui_neopixel_light</a:t>
-            </a:r>
-            <a:r>
-              <a:rPr lang="de-AT" dirty="0"/>
-              <a:t>/</a:t>
-            </a:r>
-            <a:r>
-              <a:rPr lang="de-AT" dirty="0" err="1"/>
-              <a:t>commandmode</a:t>
-            </a:r>
-            <a:r>
-              <a:rPr lang="de-AT" dirty="0"/>
-              <a:t>: </a:t>
-            </a:r>
-            <a:r>
-              <a:rPr lang="de-AT" dirty="0" err="1"/>
-              <a:t>single</a:t>
-            </a:r>
+              <a:rPr lang="de-DE" dirty="0"/>
+              <a:t>wie aussagekräftig sind die berechneten werte des für co2 beim bme680</a:t>
+            </a:r>
+          </a:p>
+          <a:p>
+            <a:r>
+              <a:rPr lang="de-DE" b="1" dirty="0"/>
+              <a:t>ChatGPT:</a:t>
+            </a:r>
+          </a:p>
+          <a:p>
+            <a:r>
+              <a:rPr lang="de-DE" dirty="0"/>
+              <a:t>ChatGPT</a:t>
+            </a:r>
+          </a:p>
+          <a:p>
+            <a:r>
+              <a:rPr lang="de-DE" dirty="0"/>
+              <a:t>Die berechneten CO₂-Werte des BME680 (genauer gesagt die </a:t>
+            </a:r>
+            <a:r>
+              <a:rPr lang="de-DE" b="1" dirty="0"/>
+              <a:t>äquivalenten CO₂-Werte</a:t>
+            </a:r>
+            <a:r>
+              <a:rPr lang="de-DE" dirty="0"/>
+              <a:t>, </a:t>
+            </a:r>
+            <a:r>
+              <a:rPr lang="de-DE" dirty="0" err="1"/>
+              <a:t>eCO</a:t>
+            </a:r>
+            <a:r>
+              <a:rPr lang="de-DE" dirty="0"/>
+              <a:t>₂) sind </a:t>
+            </a:r>
+            <a:r>
+              <a:rPr lang="de-DE" b="1" dirty="0"/>
+              <a:t>nur bedingt aussagekräftig</a:t>
+            </a:r>
+            <a:r>
+              <a:rPr lang="de-DE" dirty="0"/>
+              <a:t> und sollten mit Vorsicht interpretiert werden. Hier sind die wichtigsten Punkte:</a:t>
+            </a:r>
+          </a:p>
+          <a:p>
+            <a:r>
+              <a:rPr lang="de-DE" b="1" dirty="0"/>
+              <a:t>1. Kein direkter CO₂-Sensor</a:t>
+            </a:r>
+          </a:p>
+          <a:p>
+            <a:pPr>
+              <a:buFont typeface="Arial" panose="020B0604020202020204" pitchFamily="34" charset="0"/>
+              <a:buChar char="•"/>
+            </a:pPr>
+            <a:r>
+              <a:rPr lang="de-DE" dirty="0"/>
+              <a:t>Der BME680 misst keinen CO₂-Gehalt direkt, sondern verwendet einen </a:t>
+            </a:r>
+            <a:r>
+              <a:rPr lang="de-DE" b="1" dirty="0"/>
+              <a:t>MOX-Gaswiderstandssensor</a:t>
+            </a:r>
+            <a:r>
+              <a:rPr lang="de-DE" dirty="0"/>
+              <a:t>, der auf Änderungen in der Konzentration von flüchtigen organischen Verbindungen (VOCs) reagiert.</a:t>
+            </a:r>
+          </a:p>
+          <a:p>
+            <a:pPr>
+              <a:buFont typeface="Arial" panose="020B0604020202020204" pitchFamily="34" charset="0"/>
+              <a:buChar char="•"/>
+            </a:pPr>
+            <a:r>
+              <a:rPr lang="de-DE" dirty="0"/>
+              <a:t>VOCs können von einer Vielzahl von Quellen stammen, wie Atemluft, Lösungsmitteln, Reinigungsmitteln, Möbeln, Farben, etc.</a:t>
+            </a:r>
+          </a:p>
+          <a:p>
+            <a:pPr>
+              <a:buFont typeface="Arial" panose="020B0604020202020204" pitchFamily="34" charset="0"/>
+              <a:buChar char="•"/>
+            </a:pPr>
+            <a:r>
+              <a:rPr lang="de-DE" dirty="0"/>
+              <a:t>Der Sensor verwendet diese VOC-Werte zusammen mit Algorithmen (z. B. in der Bosch BSEC-Bibliothek), um eine Schätzung des CO₂-Gehalts abzuleiten. Dies wird als </a:t>
+            </a:r>
+            <a:r>
+              <a:rPr lang="de-DE" b="1" dirty="0"/>
+              <a:t>äquivalentes CO₂ (</a:t>
+            </a:r>
+            <a:r>
+              <a:rPr lang="de-DE" b="1" dirty="0" err="1"/>
+              <a:t>eCO</a:t>
+            </a:r>
+            <a:r>
+              <a:rPr lang="de-DE" b="1" dirty="0"/>
+              <a:t>₂)</a:t>
+            </a:r>
+            <a:r>
+              <a:rPr lang="de-DE" dirty="0"/>
+              <a:t> bezeichnet.</a:t>
+            </a:r>
+          </a:p>
+          <a:p>
+            <a:r>
+              <a:rPr lang="de-DE" b="1" dirty="0"/>
+              <a:t>2. Einschränkungen der Genauigkeit</a:t>
+            </a:r>
+          </a:p>
+          <a:p>
+            <a:pPr>
+              <a:buFont typeface="Arial" panose="020B0604020202020204" pitchFamily="34" charset="0"/>
+              <a:buChar char="•"/>
+            </a:pPr>
+            <a:r>
+              <a:rPr lang="de-DE" b="1" dirty="0"/>
+              <a:t>Generalisierung der Algorithmen</a:t>
+            </a:r>
+            <a:r>
+              <a:rPr lang="de-DE" dirty="0"/>
+              <a:t>: Die Schätzung basiert auf vorgefertigten Modellen und Annahmen, die möglicherweise nicht alle Umgebungsbedingungen abdecken.</a:t>
+            </a:r>
+          </a:p>
+          <a:p>
+            <a:pPr>
+              <a:buFont typeface="Arial" panose="020B0604020202020204" pitchFamily="34" charset="0"/>
+              <a:buChar char="•"/>
+            </a:pPr>
+            <a:r>
+              <a:rPr lang="de-DE" b="1" dirty="0"/>
+              <a:t>Korrelation mit tatsächlichem CO₂</a:t>
+            </a:r>
+            <a:r>
+              <a:rPr lang="de-DE" dirty="0"/>
+              <a:t>: Die berechneten </a:t>
+            </a:r>
+            <a:r>
+              <a:rPr lang="de-DE" dirty="0" err="1"/>
+              <a:t>eCO</a:t>
+            </a:r>
+            <a:r>
+              <a:rPr lang="de-DE" dirty="0"/>
+              <a:t>₂-Werte sind oft nicht gut mit tatsächlichen CO₂-Messungen (z. B. von NDIR-Sensoren wie SCD30 oder SCD40) korreliert.</a:t>
+            </a:r>
+          </a:p>
+          <a:p>
+            <a:pPr marL="742950" lvl="1" indent="-285750">
+              <a:buFont typeface="Arial" panose="020B0604020202020204" pitchFamily="34" charset="0"/>
+              <a:buChar char="•"/>
+            </a:pPr>
+            <a:r>
+              <a:rPr lang="de-DE" dirty="0"/>
+              <a:t>Beispiel: Hohe VOC-Konzentrationen (z. B. durch Reinigungsmittel) können zu hohen </a:t>
+            </a:r>
+            <a:r>
+              <a:rPr lang="de-DE" dirty="0" err="1"/>
+              <a:t>eCO</a:t>
+            </a:r>
+            <a:r>
+              <a:rPr lang="de-DE" dirty="0"/>
+              <a:t>₂-Werten führen, obwohl die tatsächliche CO₂-Konzentration niedrig ist.</a:t>
+            </a:r>
+          </a:p>
+          <a:p>
+            <a:pPr marL="742950" lvl="1" indent="-285750">
+              <a:buFont typeface="Arial" panose="020B0604020202020204" pitchFamily="34" charset="0"/>
+              <a:buChar char="•"/>
+            </a:pPr>
+            <a:r>
+              <a:rPr lang="de-DE" dirty="0"/>
+              <a:t>Umgekehrt kann eine saubere, VOC-arme Umgebung niedrige </a:t>
+            </a:r>
+            <a:r>
+              <a:rPr lang="de-DE" dirty="0" err="1"/>
+              <a:t>eCO</a:t>
+            </a:r>
+            <a:r>
+              <a:rPr lang="de-DE" dirty="0"/>
+              <a:t>₂-Werte anzeigen, obwohl der CO₂-Gehalt hoch ist.</a:t>
+            </a:r>
+          </a:p>
+          <a:p>
+            <a:pPr>
+              <a:buFont typeface="Arial" panose="020B0604020202020204" pitchFamily="34" charset="0"/>
+              <a:buChar char="•"/>
+            </a:pPr>
+            <a:r>
+              <a:rPr lang="de-DE" b="1" dirty="0"/>
+              <a:t>Abhängigkeit von Temperatur und Feuchtigkeit</a:t>
+            </a:r>
+            <a:r>
+              <a:rPr lang="de-DE" dirty="0"/>
+              <a:t>: Der Sensor verwendet auch Temperatur- und Feuchtigkeitsdaten zur Berechnung. Fehler in diesen Messungen können die Schätzung weiter beeinträchtigen.</a:t>
+            </a:r>
+          </a:p>
+          <a:p>
+            <a:r>
+              <a:rPr lang="de-DE" b="1" dirty="0"/>
+              <a:t>3. Anwendungen und Anwendungsfälle</a:t>
+            </a:r>
+          </a:p>
+          <a:p>
+            <a:pPr>
+              <a:buFont typeface="Arial" panose="020B0604020202020204" pitchFamily="34" charset="0"/>
+              <a:buChar char="•"/>
+            </a:pPr>
+            <a:r>
+              <a:rPr lang="de-DE" b="1" dirty="0"/>
+              <a:t>Geeignet für:</a:t>
+            </a:r>
+            <a:endParaRPr lang="de-DE" dirty="0"/>
+          </a:p>
+          <a:p>
+            <a:pPr marL="742950" lvl="1" indent="-285750">
+              <a:buFont typeface="Arial" panose="020B0604020202020204" pitchFamily="34" charset="0"/>
+              <a:buChar char="•"/>
+            </a:pPr>
+            <a:r>
+              <a:rPr lang="de-DE" b="1" dirty="0"/>
+              <a:t>Relative Trends</a:t>
+            </a:r>
+            <a:r>
+              <a:rPr lang="de-DE" dirty="0"/>
+              <a:t>: Der BME680 ist gut darin, Veränderungen in der Luftqualität zu erfassen. Zum Beispiel kannst du erkennen, ob die Luft durch Aktivitäten wie Kochen oder Atmen in einem geschlossenen Raum „schlechter“ wird.</a:t>
+            </a:r>
+          </a:p>
+          <a:p>
+            <a:pPr marL="742950" lvl="1" indent="-285750">
+              <a:buFont typeface="Arial" panose="020B0604020202020204" pitchFamily="34" charset="0"/>
+              <a:buChar char="•"/>
+            </a:pPr>
+            <a:r>
+              <a:rPr lang="de-DE" b="1" dirty="0"/>
+              <a:t>Luftqualitätsüberwachung</a:t>
+            </a:r>
+            <a:r>
+              <a:rPr lang="de-DE" dirty="0"/>
+              <a:t>: In Anwendungen, bei denen genaue CO₂-Werte weniger entscheidend sind und allgemeine Luftqualitätsinformationen genügen.</a:t>
+            </a:r>
+          </a:p>
+          <a:p>
+            <a:pPr>
+              <a:buFont typeface="Arial" panose="020B0604020202020204" pitchFamily="34" charset="0"/>
+              <a:buChar char="•"/>
+            </a:pPr>
+            <a:r>
+              <a:rPr lang="de-DE" b="1" dirty="0"/>
+              <a:t>Nicht geeignet für:</a:t>
+            </a:r>
+            <a:endParaRPr lang="de-DE" dirty="0"/>
+          </a:p>
+          <a:p>
+            <a:pPr marL="742950" lvl="1" indent="-285750">
+              <a:buFont typeface="Arial" panose="020B0604020202020204" pitchFamily="34" charset="0"/>
+              <a:buChar char="•"/>
+            </a:pPr>
+            <a:r>
+              <a:rPr lang="de-DE" b="1" dirty="0"/>
+              <a:t>Exakte CO₂-Messungen</a:t>
+            </a:r>
+            <a:r>
+              <a:rPr lang="de-DE" dirty="0"/>
+              <a:t>: Für Anwendungen, bei denen eine genaue Messung des CO₂-Gehalts entscheidend ist (z. B. in Labors oder zur Einhaltung von Luftqualitätsnormen), ist ein NDIR-Sensor erforderlich.</a:t>
+            </a:r>
+          </a:p>
+          <a:p>
+            <a:r>
+              <a:rPr lang="de-DE" b="1" dirty="0"/>
+              <a:t>4. Fazit</a:t>
+            </a:r>
+          </a:p>
+          <a:p>
+            <a:r>
+              <a:rPr lang="de-DE" dirty="0"/>
+              <a:t>Die </a:t>
+            </a:r>
+            <a:r>
+              <a:rPr lang="de-DE" dirty="0" err="1"/>
+              <a:t>eCO</a:t>
+            </a:r>
+            <a:r>
+              <a:rPr lang="de-DE" dirty="0"/>
+              <a:t>₂-Werte des BME680 sind eine grobe Schätzung, die mehr als </a:t>
+            </a:r>
+            <a:r>
+              <a:rPr lang="de-DE" b="1" dirty="0"/>
+              <a:t>Indikator für Luftqualität</a:t>
+            </a:r>
+            <a:r>
+              <a:rPr lang="de-DE" dirty="0"/>
+              <a:t> denn als exakte CO₂-Messung betrachtet werden sollte. Für präzise CO₂-Überwachung in Umgebungen, wo dies kritisch ist, solltest du auf Sensoren wie den </a:t>
+            </a:r>
+            <a:r>
+              <a:rPr lang="de-DE" b="1" dirty="0"/>
+              <a:t>SCD40, SCD30 oder MH-Z19</a:t>
+            </a:r>
+            <a:r>
+              <a:rPr lang="de-DE" dirty="0"/>
+              <a:t> ausweichen, die auf dem NDIR-Messprinzip basieren</a:t>
+            </a:r>
+          </a:p>
+          <a:p>
             <a:endParaRPr lang="de-AT" dirty="0"/>
           </a:p>
         </p:txBody>
@@ -6387,6 +6110,685 @@
                 <a:defRPr/>
               </a:pPr>
               <a:t>70</a:t>
+            </a:fld>
+            <a:endParaRPr lang="de-AT"/>
+          </a:p>
+        </p:txBody>
+      </p:sp>
+    </p:spTree>
+    <p:extLst>
+      <p:ext uri="{BB962C8B-B14F-4D97-AF65-F5344CB8AC3E}">
+        <p14:creationId xmlns:p14="http://schemas.microsoft.com/office/powerpoint/2010/main" val="1428768138"/>
+      </p:ext>
+    </p:extLst>
+  </p:cSld>
+  <p:clrMapOvr>
+    <a:masterClrMapping/>
+  </p:clrMapOvr>
+</p:notes>
+</file>
+
+<file path=ppt/notesSlides/notesSlide5.xml><?xml version="1.0" encoding="utf-8"?>
+<p:notes xmlns:a="http://schemas.openxmlformats.org/drawingml/2006/main" xmlns:r="http://schemas.openxmlformats.org/officeDocument/2006/relationships" xmlns:p="http://schemas.openxmlformats.org/presentationml/2006/main">
+  <p:cSld>
+    <p:spTree>
+      <p:nvGrpSpPr>
+        <p:cNvPr id="1" name=""/>
+        <p:cNvGrpSpPr/>
+        <p:nvPr/>
+      </p:nvGrpSpPr>
+      <p:grpSpPr>
+        <a:xfrm>
+          <a:off x="0" y="0"/>
+          <a:ext cx="0" cy="0"/>
+          <a:chOff x="0" y="0"/>
+          <a:chExt cx="0" cy="0"/>
+        </a:xfrm>
+      </p:grpSpPr>
+      <p:sp>
+        <p:nvSpPr>
+          <p:cNvPr id="2" name="Folienbildplatzhalter 1"/>
+          <p:cNvSpPr>
+            <a:spLocks noGrp="1" noRot="1" noChangeAspect="1"/>
+          </p:cNvSpPr>
+          <p:nvPr>
+            <p:ph type="sldImg"/>
+          </p:nvPr>
+        </p:nvSpPr>
+        <p:spPr>
+          <a:xfrm>
+            <a:off x="917575" y="744538"/>
+            <a:ext cx="4962525" cy="3722687"/>
+          </a:xfrm>
+        </p:spPr>
+      </p:sp>
+      <p:sp>
+        <p:nvSpPr>
+          <p:cNvPr id="3" name="Notizenplatzhalter 2"/>
+          <p:cNvSpPr>
+            <a:spLocks noGrp="1"/>
+          </p:cNvSpPr>
+          <p:nvPr>
+            <p:ph type="body" idx="1"/>
+          </p:nvPr>
+        </p:nvSpPr>
+        <p:spPr/>
+        <p:txBody>
+          <a:bodyPr/>
+          <a:lstStyle/>
+          <a:p>
+            <a:r>
+              <a:rPr lang="de-AT" dirty="0"/>
+              <a:t>alias: </a:t>
+            </a:r>
+            <a:r>
+              <a:rPr lang="de-AT" dirty="0" err="1"/>
+              <a:t>SensorBox</a:t>
+            </a:r>
+            <a:r>
+              <a:rPr lang="de-AT" dirty="0"/>
+              <a:t> </a:t>
+            </a:r>
+            <a:r>
+              <a:rPr lang="de-AT" dirty="0" err="1"/>
+              <a:t>NeoPixeldescription</a:t>
+            </a:r>
+            <a:r>
+              <a:rPr lang="de-AT" dirty="0"/>
+              <a:t>: ""</a:t>
+            </a:r>
+            <a:r>
+              <a:rPr lang="de-AT" dirty="0" err="1"/>
+              <a:t>trigger</a:t>
+            </a:r>
+            <a:r>
+              <a:rPr lang="de-AT" dirty="0"/>
+              <a:t>:  - </a:t>
+            </a:r>
+            <a:r>
+              <a:rPr lang="de-AT" dirty="0" err="1"/>
+              <a:t>platform</a:t>
+            </a:r>
+            <a:r>
+              <a:rPr lang="de-AT" dirty="0"/>
+              <a:t>: </a:t>
+            </a:r>
+            <a:r>
+              <a:rPr lang="de-AT" dirty="0" err="1"/>
+              <a:t>state</a:t>
+            </a:r>
+            <a:r>
+              <a:rPr lang="de-AT" dirty="0"/>
+              <a:t>    </a:t>
+            </a:r>
+            <a:r>
+              <a:rPr lang="de-AT" dirty="0" err="1"/>
+              <a:t>entity_id</a:t>
+            </a:r>
+            <a:r>
+              <a:rPr lang="de-AT" dirty="0"/>
+              <a:t>:      - sensor.kerui_co2condition: []</a:t>
+            </a:r>
+            <a:r>
+              <a:rPr lang="de-AT" dirty="0" err="1"/>
+              <a:t>action</a:t>
+            </a:r>
+            <a:r>
+              <a:rPr lang="de-AT" dirty="0"/>
+              <a:t>:  - </a:t>
+            </a:r>
+            <a:r>
+              <a:rPr lang="de-AT" dirty="0" err="1"/>
+              <a:t>choose</a:t>
+            </a:r>
+            <a:r>
+              <a:rPr lang="de-AT" dirty="0"/>
+              <a:t>:      - </a:t>
+            </a:r>
+            <a:r>
+              <a:rPr lang="de-AT" dirty="0" err="1"/>
+              <a:t>conditions</a:t>
+            </a:r>
+            <a:r>
+              <a:rPr lang="de-AT" dirty="0"/>
+              <a:t>:          - </a:t>
+            </a:r>
+            <a:r>
+              <a:rPr lang="de-AT" dirty="0" err="1"/>
+              <a:t>condition</a:t>
+            </a:r>
+            <a:r>
+              <a:rPr lang="de-AT" dirty="0"/>
+              <a:t>: </a:t>
+            </a:r>
+            <a:r>
+              <a:rPr lang="de-AT" dirty="0" err="1"/>
+              <a:t>numeric_state</a:t>
+            </a:r>
+            <a:r>
+              <a:rPr lang="de-AT" dirty="0"/>
+              <a:t>            </a:t>
+            </a:r>
+            <a:r>
+              <a:rPr lang="de-AT" dirty="0" err="1"/>
+              <a:t>entity_id</a:t>
+            </a:r>
+            <a:r>
+              <a:rPr lang="de-AT" dirty="0"/>
+              <a:t>: sensor.kerui_co2            </a:t>
+            </a:r>
+            <a:r>
+              <a:rPr lang="de-AT" dirty="0" err="1"/>
+              <a:t>above</a:t>
+            </a:r>
+            <a:r>
+              <a:rPr lang="de-AT" dirty="0"/>
+              <a:t>: 800        </a:t>
+            </a:r>
+            <a:r>
+              <a:rPr lang="de-AT" dirty="0" err="1"/>
+              <a:t>sequence</a:t>
+            </a:r>
+            <a:r>
+              <a:rPr lang="de-AT" dirty="0"/>
+              <a:t>:          - </a:t>
+            </a:r>
+            <a:r>
+              <a:rPr lang="de-AT" dirty="0" err="1"/>
+              <a:t>service</a:t>
+            </a:r>
+            <a:r>
+              <a:rPr lang="de-AT" dirty="0"/>
+              <a:t>: </a:t>
+            </a:r>
+            <a:r>
+              <a:rPr lang="de-AT" dirty="0" err="1"/>
+              <a:t>mqtt.publish</a:t>
+            </a:r>
+            <a:r>
+              <a:rPr lang="de-AT" dirty="0"/>
+              <a:t>            </a:t>
+            </a:r>
+            <a:r>
+              <a:rPr lang="de-AT" dirty="0" err="1"/>
+              <a:t>data</a:t>
+            </a:r>
+            <a:r>
+              <a:rPr lang="de-AT" dirty="0"/>
+              <a:t>:              </a:t>
+            </a:r>
+            <a:r>
+              <a:rPr lang="de-AT" dirty="0" err="1"/>
+              <a:t>qos</a:t>
+            </a:r>
+            <a:r>
+              <a:rPr lang="de-AT" dirty="0"/>
+              <a:t>: "2"              </a:t>
+            </a:r>
+            <a:r>
+              <a:rPr lang="de-AT" dirty="0" err="1"/>
+              <a:t>topic</a:t>
+            </a:r>
+            <a:r>
+              <a:rPr lang="de-AT" dirty="0"/>
+              <a:t>: </a:t>
+            </a:r>
+            <a:r>
+              <a:rPr lang="de-AT" dirty="0" err="1"/>
+              <a:t>kerui</a:t>
+            </a:r>
+            <a:r>
+              <a:rPr lang="de-AT" dirty="0"/>
+              <a:t>/light/</a:t>
+            </a:r>
+            <a:r>
+              <a:rPr lang="de-AT" dirty="0" err="1"/>
+              <a:t>kerui_neopixel_light</a:t>
+            </a:r>
+            <a:r>
+              <a:rPr lang="de-AT" dirty="0"/>
+              <a:t>/</a:t>
+            </a:r>
+            <a:r>
+              <a:rPr lang="de-AT" dirty="0" err="1"/>
+              <a:t>command</a:t>
+            </a:r>
+            <a:r>
+              <a:rPr lang="de-AT" dirty="0"/>
+              <a:t>              </a:t>
+            </a:r>
+            <a:r>
+              <a:rPr lang="de-AT" dirty="0" err="1"/>
+              <a:t>retain</a:t>
+            </a:r>
+            <a:r>
+              <a:rPr lang="de-AT" dirty="0"/>
+              <a:t>: </a:t>
+            </a:r>
+            <a:r>
+              <a:rPr lang="de-AT" dirty="0" err="1"/>
+              <a:t>false</a:t>
+            </a:r>
+            <a:r>
+              <a:rPr lang="de-AT" dirty="0"/>
+              <a:t>              </a:t>
+            </a:r>
+            <a:r>
+              <a:rPr lang="de-AT" dirty="0" err="1"/>
+              <a:t>payload</a:t>
+            </a:r>
+            <a:r>
+              <a:rPr lang="de-AT" dirty="0"/>
+              <a:t>: &gt;-                {   "</a:t>
+            </a:r>
+            <a:r>
+              <a:rPr lang="de-AT" dirty="0" err="1"/>
+              <a:t>color_mode</a:t>
+            </a:r>
+            <a:r>
+              <a:rPr lang="de-AT" dirty="0"/>
+              <a:t>": "</a:t>
+            </a:r>
+            <a:r>
+              <a:rPr lang="de-AT" dirty="0" err="1"/>
+              <a:t>rgb</a:t>
+            </a:r>
+            <a:r>
+              <a:rPr lang="de-AT" dirty="0"/>
+              <a:t>",   "</a:t>
+            </a:r>
+            <a:r>
+              <a:rPr lang="de-AT" dirty="0" err="1"/>
+              <a:t>state</a:t>
+            </a:r>
+            <a:r>
+              <a:rPr lang="de-AT" dirty="0"/>
+              <a:t>": "ON",   "</a:t>
+            </a:r>
+            <a:r>
+              <a:rPr lang="de-AT" dirty="0" err="1"/>
+              <a:t>brightness</a:t>
+            </a:r>
+            <a:r>
+              <a:rPr lang="de-AT" dirty="0"/>
+              <a:t>": 180,                  "</a:t>
+            </a:r>
+            <a:r>
+              <a:rPr lang="de-AT" dirty="0" err="1"/>
+              <a:t>color</a:t>
+            </a:r>
+            <a:r>
+              <a:rPr lang="de-AT" dirty="0"/>
+              <a:t>": {     "r": 255,     "g": 0,     "b": 0   } }      - </a:t>
+            </a:r>
+            <a:r>
+              <a:rPr lang="de-AT" dirty="0" err="1"/>
+              <a:t>conditions</a:t>
+            </a:r>
+            <a:r>
+              <a:rPr lang="de-AT" dirty="0"/>
+              <a:t>:          - </a:t>
+            </a:r>
+            <a:r>
+              <a:rPr lang="de-AT" dirty="0" err="1"/>
+              <a:t>condition</a:t>
+            </a:r>
+            <a:r>
+              <a:rPr lang="de-AT" dirty="0"/>
+              <a:t>: </a:t>
+            </a:r>
+            <a:r>
+              <a:rPr lang="de-AT" dirty="0" err="1"/>
+              <a:t>numeric_state</a:t>
+            </a:r>
+            <a:r>
+              <a:rPr lang="de-AT" dirty="0"/>
+              <a:t>            </a:t>
+            </a:r>
+            <a:r>
+              <a:rPr lang="de-AT" dirty="0" err="1"/>
+              <a:t>entity_id</a:t>
+            </a:r>
+            <a:r>
+              <a:rPr lang="de-AT" dirty="0"/>
+              <a:t>: sensor.kerui_co2            </a:t>
+            </a:r>
+            <a:r>
+              <a:rPr lang="de-AT" dirty="0" err="1"/>
+              <a:t>above</a:t>
+            </a:r>
+            <a:r>
+              <a:rPr lang="de-AT" dirty="0"/>
+              <a:t>: 500            </a:t>
+            </a:r>
+            <a:r>
+              <a:rPr lang="de-AT" dirty="0" err="1"/>
+              <a:t>below</a:t>
+            </a:r>
+            <a:r>
+              <a:rPr lang="de-AT" dirty="0"/>
+              <a:t>: 800        </a:t>
+            </a:r>
+            <a:r>
+              <a:rPr lang="de-AT" dirty="0" err="1"/>
+              <a:t>sequence</a:t>
+            </a:r>
+            <a:r>
+              <a:rPr lang="de-AT" dirty="0"/>
+              <a:t>:          - </a:t>
+            </a:r>
+            <a:r>
+              <a:rPr lang="de-AT" dirty="0" err="1"/>
+              <a:t>service</a:t>
+            </a:r>
+            <a:r>
+              <a:rPr lang="de-AT" dirty="0"/>
+              <a:t>: </a:t>
+            </a:r>
+            <a:r>
+              <a:rPr lang="de-AT" dirty="0" err="1"/>
+              <a:t>mqtt.publish</a:t>
+            </a:r>
+            <a:r>
+              <a:rPr lang="de-AT" dirty="0"/>
+              <a:t>            </a:t>
+            </a:r>
+            <a:r>
+              <a:rPr lang="de-AT" dirty="0" err="1"/>
+              <a:t>data</a:t>
+            </a:r>
+            <a:r>
+              <a:rPr lang="de-AT" dirty="0"/>
+              <a:t>:              </a:t>
+            </a:r>
+            <a:r>
+              <a:rPr lang="de-AT" dirty="0" err="1"/>
+              <a:t>topic</a:t>
+            </a:r>
+            <a:r>
+              <a:rPr lang="de-AT" dirty="0"/>
+              <a:t>: </a:t>
+            </a:r>
+            <a:r>
+              <a:rPr lang="de-AT" dirty="0" err="1"/>
+              <a:t>kerui</a:t>
+            </a:r>
+            <a:r>
+              <a:rPr lang="de-AT" dirty="0"/>
+              <a:t>/light/</a:t>
+            </a:r>
+            <a:r>
+              <a:rPr lang="de-AT" dirty="0" err="1"/>
+              <a:t>kerui_neopixel_light</a:t>
+            </a:r>
+            <a:r>
+              <a:rPr lang="de-AT" dirty="0"/>
+              <a:t>/</a:t>
+            </a:r>
+            <a:r>
+              <a:rPr lang="de-AT" dirty="0" err="1"/>
+              <a:t>command</a:t>
+            </a:r>
+            <a:r>
+              <a:rPr lang="de-AT" dirty="0"/>
+              <a:t>              </a:t>
+            </a:r>
+            <a:r>
+              <a:rPr lang="de-AT" dirty="0" err="1"/>
+              <a:t>retain</a:t>
+            </a:r>
+            <a:r>
+              <a:rPr lang="de-AT" dirty="0"/>
+              <a:t>: </a:t>
+            </a:r>
+            <a:r>
+              <a:rPr lang="de-AT" dirty="0" err="1"/>
+              <a:t>false</a:t>
+            </a:r>
+            <a:r>
+              <a:rPr lang="de-AT" dirty="0"/>
+              <a:t>              </a:t>
+            </a:r>
+            <a:r>
+              <a:rPr lang="de-AT" dirty="0" err="1"/>
+              <a:t>payload</a:t>
+            </a:r>
+            <a:r>
+              <a:rPr lang="de-AT" dirty="0"/>
+              <a:t>: &gt;-                {   "</a:t>
+            </a:r>
+            <a:r>
+              <a:rPr lang="de-AT" dirty="0" err="1"/>
+              <a:t>color_mode</a:t>
+            </a:r>
+            <a:r>
+              <a:rPr lang="de-AT" dirty="0"/>
+              <a:t>": "</a:t>
+            </a:r>
+            <a:r>
+              <a:rPr lang="de-AT" dirty="0" err="1"/>
+              <a:t>rgb</a:t>
+            </a:r>
+            <a:r>
+              <a:rPr lang="de-AT" dirty="0"/>
+              <a:t>",   "</a:t>
+            </a:r>
+            <a:r>
+              <a:rPr lang="de-AT" dirty="0" err="1"/>
+              <a:t>state</a:t>
+            </a:r>
+            <a:r>
+              <a:rPr lang="de-AT" dirty="0"/>
+              <a:t>": "ON",   "</a:t>
+            </a:r>
+            <a:r>
+              <a:rPr lang="de-AT" dirty="0" err="1"/>
+              <a:t>brightness</a:t>
+            </a:r>
+            <a:r>
+              <a:rPr lang="de-AT" dirty="0"/>
+              <a:t>": 180,                  "</a:t>
+            </a:r>
+            <a:r>
+              <a:rPr lang="de-AT" dirty="0" err="1"/>
+              <a:t>color</a:t>
+            </a:r>
+            <a:r>
+              <a:rPr lang="de-AT" dirty="0"/>
+              <a:t>": {     "r": 0,     "g": 0,     "b": 255   } }      - </a:t>
+            </a:r>
+            <a:r>
+              <a:rPr lang="de-AT" dirty="0" err="1"/>
+              <a:t>conditions</a:t>
+            </a:r>
+            <a:r>
+              <a:rPr lang="de-AT" dirty="0"/>
+              <a:t>:          - </a:t>
+            </a:r>
+            <a:r>
+              <a:rPr lang="de-AT" dirty="0" err="1"/>
+              <a:t>condition</a:t>
+            </a:r>
+            <a:r>
+              <a:rPr lang="de-AT" dirty="0"/>
+              <a:t>: </a:t>
+            </a:r>
+            <a:r>
+              <a:rPr lang="de-AT" dirty="0" err="1"/>
+              <a:t>numeric_state</a:t>
+            </a:r>
+            <a:r>
+              <a:rPr lang="de-AT" dirty="0"/>
+              <a:t>            </a:t>
+            </a:r>
+            <a:r>
+              <a:rPr lang="de-AT" dirty="0" err="1"/>
+              <a:t>entity_id</a:t>
+            </a:r>
+            <a:r>
+              <a:rPr lang="de-AT" dirty="0"/>
+              <a:t>: sensor.kerui_co2            </a:t>
+            </a:r>
+            <a:r>
+              <a:rPr lang="de-AT" dirty="0" err="1"/>
+              <a:t>below</a:t>
+            </a:r>
+            <a:r>
+              <a:rPr lang="de-AT" dirty="0"/>
+              <a:t>: 500        </a:t>
+            </a:r>
+            <a:r>
+              <a:rPr lang="de-AT" dirty="0" err="1"/>
+              <a:t>sequence</a:t>
+            </a:r>
+            <a:r>
+              <a:rPr lang="de-AT" dirty="0"/>
+              <a:t>:          - </a:t>
+            </a:r>
+            <a:r>
+              <a:rPr lang="de-AT" dirty="0" err="1"/>
+              <a:t>service</a:t>
+            </a:r>
+            <a:r>
+              <a:rPr lang="de-AT" dirty="0"/>
+              <a:t>: </a:t>
+            </a:r>
+            <a:r>
+              <a:rPr lang="de-AT" dirty="0" err="1"/>
+              <a:t>mqtt.publish</a:t>
+            </a:r>
+            <a:r>
+              <a:rPr lang="de-AT" dirty="0"/>
+              <a:t>            </a:t>
+            </a:r>
+            <a:r>
+              <a:rPr lang="de-AT" dirty="0" err="1"/>
+              <a:t>data</a:t>
+            </a:r>
+            <a:r>
+              <a:rPr lang="de-AT" dirty="0"/>
+              <a:t>:              </a:t>
+            </a:r>
+            <a:r>
+              <a:rPr lang="de-AT" dirty="0" err="1"/>
+              <a:t>qos</a:t>
+            </a:r>
+            <a:r>
+              <a:rPr lang="de-AT" dirty="0"/>
+              <a:t>: "2"              </a:t>
+            </a:r>
+            <a:r>
+              <a:rPr lang="de-AT" dirty="0" err="1"/>
+              <a:t>payload</a:t>
+            </a:r>
+            <a:r>
+              <a:rPr lang="de-AT" dirty="0"/>
+              <a:t>: &gt;-                {   "</a:t>
+            </a:r>
+            <a:r>
+              <a:rPr lang="de-AT" dirty="0" err="1"/>
+              <a:t>color_mode</a:t>
+            </a:r>
+            <a:r>
+              <a:rPr lang="de-AT" dirty="0"/>
+              <a:t>": "</a:t>
+            </a:r>
+            <a:r>
+              <a:rPr lang="de-AT" dirty="0" err="1"/>
+              <a:t>rgb</a:t>
+            </a:r>
+            <a:r>
+              <a:rPr lang="de-AT" dirty="0"/>
+              <a:t>",   "</a:t>
+            </a:r>
+            <a:r>
+              <a:rPr lang="de-AT" dirty="0" err="1"/>
+              <a:t>state</a:t>
+            </a:r>
+            <a:r>
+              <a:rPr lang="de-AT" dirty="0"/>
+              <a:t>": "ON",   "</a:t>
+            </a:r>
+            <a:r>
+              <a:rPr lang="de-AT" dirty="0" err="1"/>
+              <a:t>brightness</a:t>
+            </a:r>
+            <a:r>
+              <a:rPr lang="de-AT" dirty="0"/>
+              <a:t>": 180,                  "</a:t>
+            </a:r>
+            <a:r>
+              <a:rPr lang="de-AT" dirty="0" err="1"/>
+              <a:t>color</a:t>
+            </a:r>
+            <a:r>
+              <a:rPr lang="de-AT" dirty="0"/>
+              <a:t>": {     "r": 0,     "g": 255,     "b": 0   } }              </a:t>
+            </a:r>
+            <a:r>
+              <a:rPr lang="de-AT" dirty="0" err="1"/>
+              <a:t>topic</a:t>
+            </a:r>
+            <a:r>
+              <a:rPr lang="de-AT" dirty="0"/>
+              <a:t>: </a:t>
+            </a:r>
+            <a:r>
+              <a:rPr lang="de-AT" dirty="0" err="1"/>
+              <a:t>kerui</a:t>
+            </a:r>
+            <a:r>
+              <a:rPr lang="de-AT" dirty="0"/>
+              <a:t>/light/</a:t>
+            </a:r>
+            <a:r>
+              <a:rPr lang="de-AT" dirty="0" err="1"/>
+              <a:t>kerui_neopixel_light</a:t>
+            </a:r>
+            <a:r>
+              <a:rPr lang="de-AT" dirty="0"/>
+              <a:t>/</a:t>
+            </a:r>
+            <a:r>
+              <a:rPr lang="de-AT" dirty="0" err="1"/>
+              <a:t>commandmode</a:t>
+            </a:r>
+            <a:r>
+              <a:rPr lang="de-AT" dirty="0"/>
+              <a:t>: </a:t>
+            </a:r>
+            <a:r>
+              <a:rPr lang="de-AT" dirty="0" err="1"/>
+              <a:t>single</a:t>
+            </a:r>
+            <a:endParaRPr lang="de-AT" dirty="0"/>
+          </a:p>
+        </p:txBody>
+      </p:sp>
+      <p:sp>
+        <p:nvSpPr>
+          <p:cNvPr id="4" name="Foliennummernplatzhalter 3"/>
+          <p:cNvSpPr>
+            <a:spLocks noGrp="1"/>
+          </p:cNvSpPr>
+          <p:nvPr>
+            <p:ph type="sldNum" sz="quarter" idx="5"/>
+          </p:nvPr>
+        </p:nvSpPr>
+        <p:spPr/>
+        <p:txBody>
+          <a:bodyPr/>
+          <a:lstStyle/>
+          <a:p>
+            <a:pPr>
+              <a:defRPr/>
+            </a:pPr>
+            <a:fld id="{46EAC6C9-0F3A-40E0-896B-88DE66496CB5}" type="slidenum">
+              <a:rPr lang="de-AT" smtClean="0"/>
+              <a:pPr>
+                <a:defRPr/>
+              </a:pPr>
+              <a:t>71</a:t>
             </a:fld>
             <a:endParaRPr lang="de-AT"/>
           </a:p>
@@ -16498,6 +16900,119 @@
 </file>
 
 <file path=ppt/slides/slide70.xml><?xml version="1.0" encoding="utf-8"?>
+<p:sld xmlns:a="http://schemas.openxmlformats.org/drawingml/2006/main" xmlns:r="http://schemas.openxmlformats.org/officeDocument/2006/relationships" xmlns:p="http://schemas.openxmlformats.org/presentationml/2006/main">
+  <p:cSld>
+    <p:spTree>
+      <p:nvGrpSpPr>
+        <p:cNvPr id="1" name=""/>
+        <p:cNvGrpSpPr/>
+        <p:nvPr/>
+      </p:nvGrpSpPr>
+      <p:grpSpPr>
+        <a:xfrm>
+          <a:off x="0" y="0"/>
+          <a:ext cx="0" cy="0"/>
+          <a:chOff x="0" y="0"/>
+          <a:chExt cx="0" cy="0"/>
+        </a:xfrm>
+      </p:grpSpPr>
+      <p:sp>
+        <p:nvSpPr>
+          <p:cNvPr id="2" name="Titel 1">
+            <a:extLst>
+              <a:ext uri="{FF2B5EF4-FFF2-40B4-BE49-F238E27FC236}">
+                <a16:creationId xmlns:a16="http://schemas.microsoft.com/office/drawing/2014/main" id="{C8F661B4-03FB-8B5D-1F87-C0BC3C3E223A}"/>
+              </a:ext>
+            </a:extLst>
+          </p:cNvPr>
+          <p:cNvSpPr>
+            <a:spLocks noGrp="1"/>
+          </p:cNvSpPr>
+          <p:nvPr>
+            <p:ph type="title"/>
+          </p:nvPr>
+        </p:nvSpPr>
+        <p:spPr/>
+        <p:txBody>
+          <a:bodyPr/>
+          <a:lstStyle/>
+          <a:p>
+            <a:r>
+              <a:rPr lang="de-AT" dirty="0"/>
+              <a:t>CO2-Sensoren</a:t>
+            </a:r>
+          </a:p>
+        </p:txBody>
+      </p:sp>
+      <p:sp>
+        <p:nvSpPr>
+          <p:cNvPr id="3" name="Textplatzhalter 2">
+            <a:extLst>
+              <a:ext uri="{FF2B5EF4-FFF2-40B4-BE49-F238E27FC236}">
+                <a16:creationId xmlns:a16="http://schemas.microsoft.com/office/drawing/2014/main" id="{9140D821-1BD2-3DA4-3F99-809A03B0B923}"/>
+              </a:ext>
+            </a:extLst>
+          </p:cNvPr>
+          <p:cNvSpPr>
+            <a:spLocks noGrp="1"/>
+          </p:cNvSpPr>
+          <p:nvPr>
+            <p:ph type="body" sz="quarter" idx="10"/>
+          </p:nvPr>
+        </p:nvSpPr>
+        <p:spPr/>
+        <p:txBody>
+          <a:bodyPr/>
+          <a:lstStyle/>
+          <a:p>
+            <a:endParaRPr lang="de-AT"/>
+          </a:p>
+        </p:txBody>
+      </p:sp>
+      <p:pic>
+        <p:nvPicPr>
+          <p:cNvPr id="5" name="Grafik 4">
+            <a:extLst>
+              <a:ext uri="{FF2B5EF4-FFF2-40B4-BE49-F238E27FC236}">
+                <a16:creationId xmlns:a16="http://schemas.microsoft.com/office/drawing/2014/main" id="{C6BA8E08-014D-D4EB-DA5A-636BF3B2DAF9}"/>
+              </a:ext>
+            </a:extLst>
+          </p:cNvPr>
+          <p:cNvPicPr>
+            <a:picLocks noChangeAspect="1"/>
+          </p:cNvPicPr>
+          <p:nvPr/>
+        </p:nvPicPr>
+        <p:blipFill>
+          <a:blip r:embed="rId3"/>
+          <a:stretch>
+            <a:fillRect/>
+          </a:stretch>
+        </p:blipFill>
+        <p:spPr>
+          <a:xfrm>
+            <a:off x="302760" y="1124744"/>
+            <a:ext cx="8839752" cy="2160238"/>
+          </a:xfrm>
+          <a:prstGeom prst="rect">
+            <a:avLst/>
+          </a:prstGeom>
+        </p:spPr>
+      </p:pic>
+    </p:spTree>
+    <p:extLst>
+      <p:ext uri="{BB962C8B-B14F-4D97-AF65-F5344CB8AC3E}">
+        <p14:creationId xmlns:p14="http://schemas.microsoft.com/office/powerpoint/2010/main" val="2411055669"/>
+      </p:ext>
+    </p:extLst>
+  </p:cSld>
+  <p:clrMapOvr>
+    <a:masterClrMapping/>
+  </p:clrMapOvr>
+</p:sld>
+</file>
+
+<file path=ppt/slides/slide71.xml><?xml version="1.0" encoding="utf-8"?>
 <p:sld xmlns:a="http://schemas.openxmlformats.org/drawingml/2006/main" xmlns:r="http://schemas.openxmlformats.org/officeDocument/2006/relationships" xmlns:p="http://schemas.openxmlformats.org/presentationml/2006/main">
   <p:cSld>
     <p:spTree>

</xml_diff>